<commit_message>
protect dase's intelligence right
</commit_message>
<xml_diff>
--- a/lab 01 02 03/Vmware虚拟机及ovf .pptx
+++ b/lab 01 02 03/Vmware虚拟机及ovf .pptx
@@ -203,7 +203,7 @@
           <a:p>
             <a:fld id="{5ACA2FBA-FC56-45E8-AC6E-175FA1F01BF0}" type="datetimeFigureOut">
               <a:rPr lang="zh-CN" altLang="en-US" smtClean="0"/>
-              <a:t>2024/2/27</a:t>
+              <a:t>2024/4/29</a:t>
             </a:fld>
             <a:endParaRPr lang="zh-CN" altLang="en-US"/>
           </a:p>
@@ -599,7 +599,7 @@
           <a:p>
             <a:fld id="{D2B7B17E-7FEC-4B15-A774-A7E6C13637F2}" type="datetimeFigureOut">
               <a:rPr lang="zh-CN" altLang="en-US" smtClean="0"/>
-              <a:t>2024/2/27</a:t>
+              <a:t>2024/4/29</a:t>
             </a:fld>
             <a:endParaRPr lang="zh-CN" altLang="en-US"/>
           </a:p>
@@ -767,7 +767,7 @@
           <a:p>
             <a:fld id="{D2B7B17E-7FEC-4B15-A774-A7E6C13637F2}" type="datetimeFigureOut">
               <a:rPr lang="zh-CN" altLang="en-US" smtClean="0"/>
-              <a:t>2024/2/27</a:t>
+              <a:t>2024/4/29</a:t>
             </a:fld>
             <a:endParaRPr lang="zh-CN" altLang="en-US"/>
           </a:p>
@@ -945,7 +945,7 @@
           <a:p>
             <a:fld id="{D2B7B17E-7FEC-4B15-A774-A7E6C13637F2}" type="datetimeFigureOut">
               <a:rPr lang="zh-CN" altLang="en-US" smtClean="0"/>
-              <a:t>2024/2/27</a:t>
+              <a:t>2024/4/29</a:t>
             </a:fld>
             <a:endParaRPr lang="zh-CN" altLang="en-US"/>
           </a:p>
@@ -1113,7 +1113,7 @@
           <a:p>
             <a:fld id="{D2B7B17E-7FEC-4B15-A774-A7E6C13637F2}" type="datetimeFigureOut">
               <a:rPr lang="zh-CN" altLang="en-US" smtClean="0"/>
-              <a:t>2024/2/27</a:t>
+              <a:t>2024/4/29</a:t>
             </a:fld>
             <a:endParaRPr lang="zh-CN" altLang="en-US"/>
           </a:p>
@@ -1358,7 +1358,7 @@
           <a:p>
             <a:fld id="{D2B7B17E-7FEC-4B15-A774-A7E6C13637F2}" type="datetimeFigureOut">
               <a:rPr lang="zh-CN" altLang="en-US" smtClean="0"/>
-              <a:t>2024/2/27</a:t>
+              <a:t>2024/4/29</a:t>
             </a:fld>
             <a:endParaRPr lang="zh-CN" altLang="en-US"/>
           </a:p>
@@ -1587,7 +1587,7 @@
           <a:p>
             <a:fld id="{D2B7B17E-7FEC-4B15-A774-A7E6C13637F2}" type="datetimeFigureOut">
               <a:rPr lang="zh-CN" altLang="en-US" smtClean="0"/>
-              <a:t>2024/2/27</a:t>
+              <a:t>2024/4/29</a:t>
             </a:fld>
             <a:endParaRPr lang="zh-CN" altLang="en-US"/>
           </a:p>
@@ -1951,7 +1951,7 @@
           <a:p>
             <a:fld id="{D2B7B17E-7FEC-4B15-A774-A7E6C13637F2}" type="datetimeFigureOut">
               <a:rPr lang="zh-CN" altLang="en-US" smtClean="0"/>
-              <a:t>2024/2/27</a:t>
+              <a:t>2024/4/29</a:t>
             </a:fld>
             <a:endParaRPr lang="zh-CN" altLang="en-US"/>
           </a:p>
@@ -2068,7 +2068,7 @@
           <a:p>
             <a:fld id="{D2B7B17E-7FEC-4B15-A774-A7E6C13637F2}" type="datetimeFigureOut">
               <a:rPr lang="zh-CN" altLang="en-US" smtClean="0"/>
-              <a:t>2024/2/27</a:t>
+              <a:t>2024/4/29</a:t>
             </a:fld>
             <a:endParaRPr lang="zh-CN" altLang="en-US"/>
           </a:p>
@@ -2163,7 +2163,7 @@
           <a:p>
             <a:fld id="{D2B7B17E-7FEC-4B15-A774-A7E6C13637F2}" type="datetimeFigureOut">
               <a:rPr lang="zh-CN" altLang="en-US" smtClean="0"/>
-              <a:t>2024/2/27</a:t>
+              <a:t>2024/4/29</a:t>
             </a:fld>
             <a:endParaRPr lang="zh-CN" altLang="en-US"/>
           </a:p>
@@ -2438,7 +2438,7 @@
           <a:p>
             <a:fld id="{D2B7B17E-7FEC-4B15-A774-A7E6C13637F2}" type="datetimeFigureOut">
               <a:rPr lang="zh-CN" altLang="en-US" smtClean="0"/>
-              <a:t>2024/2/27</a:t>
+              <a:t>2024/4/29</a:t>
             </a:fld>
             <a:endParaRPr lang="zh-CN" altLang="en-US"/>
           </a:p>
@@ -2690,7 +2690,7 @@
           <a:p>
             <a:fld id="{D2B7B17E-7FEC-4B15-A774-A7E6C13637F2}" type="datetimeFigureOut">
               <a:rPr lang="zh-CN" altLang="en-US" smtClean="0"/>
-              <a:t>2024/2/27</a:t>
+              <a:t>2024/4/29</a:t>
             </a:fld>
             <a:endParaRPr lang="zh-CN" altLang="en-US"/>
           </a:p>
@@ -2901,7 +2901,7 @@
           <a:p>
             <a:fld id="{D2B7B17E-7FEC-4B15-A774-A7E6C13637F2}" type="datetimeFigureOut">
               <a:rPr lang="zh-CN" altLang="en-US" smtClean="0"/>
-              <a:t>2024/2/27</a:t>
+              <a:t>2024/4/29</a:t>
             </a:fld>
             <a:endParaRPr lang="zh-CN" altLang="en-US"/>
           </a:p>
@@ -3336,16 +3336,12 @@
               <a:t>Vmware</a:t>
             </a:r>
             <a:r>
-              <a:rPr lang="zh-CN" altLang="en-US" sz="3200" dirty="0" smtClean="0">
+              <a:rPr lang="zh-CN" altLang="en-US" sz="3200" dirty="0">
                 <a:latin typeface="宋体" panose="02010600030101010101" pitchFamily="2" charset="-122"/>
                 <a:ea typeface="宋体" panose="02010600030101010101" pitchFamily="2" charset="-122"/>
               </a:rPr>
               <a:t>虚拟机下载</a:t>
             </a:r>
-            <a:endParaRPr lang="zh-CN" altLang="en-US" sz="3200" dirty="0">
-              <a:latin typeface="宋体" panose="02010600030101010101" pitchFamily="2" charset="-122"/>
-              <a:ea typeface="宋体" panose="02010600030101010101" pitchFamily="2" charset="-122"/>
-            </a:endParaRPr>
           </a:p>
         </p:txBody>
       </p:sp>
@@ -3373,11 +3369,7 @@
           <a:p>
             <a:r>
               <a:rPr lang="zh-CN" altLang="en-US" dirty="0"/>
-              <a:t>钉钉</a:t>
-            </a:r>
-            <a:r>
-              <a:rPr lang="zh-CN" altLang="en-US" dirty="0" smtClean="0"/>
-              <a:t>群文件提供了 </a:t>
+              <a:t>钉钉群文件提供了 </a:t>
             </a:r>
             <a:r>
               <a:rPr lang="en-US" altLang="zh-CN" dirty="0" err="1"/>
@@ -3401,36 +3393,24 @@
             </a:r>
             <a:r>
               <a:rPr lang="zh-CN" altLang="en-US" dirty="0"/>
-              <a:t>系统</a:t>
-            </a:r>
-            <a:r>
-              <a:rPr lang="zh-CN" altLang="en-US" dirty="0" smtClean="0"/>
-              <a:t>版本）和实验</a:t>
-            </a:r>
-            <a:r>
-              <a:rPr lang="en-US" altLang="zh-CN" dirty="0" err="1" smtClean="0"/>
+              <a:t>系统版本）和实验</a:t>
+            </a:r>
+            <a:r>
+              <a:rPr lang="en-US" altLang="zh-CN" dirty="0" err="1"/>
               <a:t>ovf</a:t>
             </a:r>
             <a:r>
-              <a:rPr lang="zh-CN" altLang="en-US" dirty="0" smtClean="0"/>
-              <a:t>文件压缩包（分卷压缩），</a:t>
-            </a:r>
-            <a:r>
               <a:rPr lang="zh-CN" altLang="en-US" dirty="0"/>
-              <a:t>请自行下载</a:t>
-            </a:r>
-            <a:r>
-              <a:rPr lang="zh-CN" altLang="en-US" dirty="0" smtClean="0"/>
-              <a:t>。</a:t>
-            </a:r>
-            <a:endParaRPr lang="en-US" altLang="zh-CN" dirty="0" smtClean="0"/>
+              <a:t>文件压缩包（分卷压缩），请自行下载。</a:t>
+            </a:r>
+            <a:endParaRPr lang="en-US" altLang="zh-CN" dirty="0"/>
           </a:p>
           <a:p>
             <a:pPr marL="285750" indent="-285750">
               <a:buFont typeface="Arial" panose="020B0604020202020204" pitchFamily="34" charset="0"/>
               <a:buChar char="•"/>
             </a:pPr>
-            <a:endParaRPr lang="en-US" altLang="zh-CN" dirty="0" smtClean="0"/>
+            <a:endParaRPr lang="en-US" altLang="zh-CN" dirty="0"/>
           </a:p>
           <a:p>
             <a:pPr marL="285750" indent="-285750">
@@ -3438,34 +3418,34 @@
               <a:buChar char="•"/>
             </a:pPr>
             <a:r>
-              <a:rPr lang="en-US" altLang="zh-CN" dirty="0" smtClean="0"/>
+              <a:rPr lang="en-US" altLang="zh-CN" dirty="0"/>
               <a:t>MAC</a:t>
             </a:r>
             <a:r>
-              <a:rPr lang="zh-CN" altLang="en-US" dirty="0" smtClean="0"/>
+              <a:rPr lang="zh-CN" altLang="en-US" dirty="0"/>
               <a:t>系统选择</a:t>
             </a:r>
             <a:r>
-              <a:rPr lang="en-US" altLang="zh-CN" dirty="0" smtClean="0"/>
+              <a:rPr lang="en-US" altLang="zh-CN" dirty="0"/>
               <a:t>mac</a:t>
             </a:r>
             <a:r>
-              <a:rPr lang="zh-CN" altLang="en-US" dirty="0" smtClean="0"/>
+              <a:rPr lang="zh-CN" altLang="en-US" dirty="0"/>
               <a:t>文件夹下的</a:t>
             </a:r>
             <a:r>
-              <a:rPr lang="en-US" altLang="zh-CN" dirty="0" smtClean="0"/>
+              <a:rPr lang="en-US" altLang="zh-CN" dirty="0"/>
               <a:t>.</a:t>
             </a:r>
             <a:r>
-              <a:rPr lang="en-US" altLang="zh-CN" dirty="0" err="1" smtClean="0"/>
+              <a:rPr lang="en-US" altLang="zh-CN" dirty="0" err="1"/>
               <a:t>dmg</a:t>
             </a:r>
             <a:r>
-              <a:rPr lang="zh-CN" altLang="en-US" dirty="0" smtClean="0"/>
+              <a:rPr lang="zh-CN" altLang="en-US" dirty="0"/>
               <a:t>文件</a:t>
             </a:r>
-            <a:endParaRPr lang="en-US" altLang="zh-CN" dirty="0" smtClean="0"/>
+            <a:endParaRPr lang="en-US" altLang="zh-CN" dirty="0"/>
           </a:p>
           <a:p>
             <a:pPr marL="285750" indent="-285750">
@@ -3473,30 +3453,29 @@
               <a:buChar char="•"/>
             </a:pPr>
             <a:r>
-              <a:rPr lang="en-US" altLang="zh-CN" dirty="0" smtClean="0"/>
+              <a:rPr lang="en-US" altLang="zh-CN" dirty="0"/>
               <a:t>Windows</a:t>
             </a:r>
             <a:r>
-              <a:rPr lang="zh-CN" altLang="en-US" dirty="0" smtClean="0"/>
+              <a:rPr lang="zh-CN" altLang="en-US" dirty="0"/>
               <a:t>系统选择</a:t>
             </a:r>
             <a:r>
-              <a:rPr lang="en-US" altLang="zh-CN" dirty="0" smtClean="0"/>
+              <a:rPr lang="en-US" altLang="zh-CN" dirty="0"/>
               <a:t>win</a:t>
             </a:r>
             <a:r>
-              <a:rPr lang="zh-CN" altLang="en-US" dirty="0" smtClean="0"/>
+              <a:rPr lang="zh-CN" altLang="en-US" dirty="0"/>
               <a:t>文件夹下的</a:t>
             </a:r>
             <a:r>
-              <a:rPr lang="en-US" altLang="zh-CN" dirty="0" smtClean="0"/>
+              <a:rPr lang="en-US" altLang="zh-CN" dirty="0"/>
               <a:t>.exe</a:t>
             </a:r>
             <a:r>
-              <a:rPr lang="zh-CN" altLang="en-US" dirty="0" smtClean="0"/>
+              <a:rPr lang="zh-CN" altLang="en-US" dirty="0"/>
               <a:t>文件</a:t>
             </a:r>
-            <a:endParaRPr lang="zh-CN" altLang="en-US" dirty="0"/>
           </a:p>
         </p:txBody>
       </p:sp>
@@ -3602,7 +3581,7 @@
         <p:spPr>
           <a:xfrm>
             <a:off x="640645" y="1788771"/>
-            <a:ext cx="5794022" cy="4247317"/>
+            <a:ext cx="5794022" cy="2585323"/>
           </a:xfrm>
           <a:prstGeom prst="rect">
             <a:avLst/>
@@ -3632,23 +3611,9 @@
           </a:p>
           <a:p>
             <a:r>
-              <a:rPr lang="en-US" altLang="zh-CN" dirty="0"/>
-              <a:t>ZF3R0-FHED2-M80TY-8QYGC-NPKYF</a:t>
-            </a:r>
-          </a:p>
-          <a:p>
-            <a:r>
-              <a:rPr lang="en-US" altLang="zh-CN" dirty="0"/>
-              <a:t>YF390-0HF8P-M81RQ-2DXQE-M2UT6</a:t>
-            </a:r>
-          </a:p>
-          <a:p>
-            <a:r>
-              <a:rPr lang="en-US" altLang="zh-CN" dirty="0"/>
-              <a:t>ZF71R-DMX85-08DQY-8YMNC-PPHV8</a:t>
-            </a:r>
-          </a:p>
-          <a:p>
+              <a:rPr lang="zh-CN" altLang="en-US" dirty="0"/>
+              <a:t>？</a:t>
+            </a:r>
             <a:endParaRPr lang="en-US" altLang="zh-CN" dirty="0"/>
           </a:p>
           <a:p>
@@ -3659,26 +3624,9 @@
           </a:p>
           <a:p>
             <a:r>
-              <a:rPr lang="en-US" altLang="zh-CN" dirty="0"/>
-              <a:t>ZF3R0-FHED2-M80TY-8QYGC-NPKYF</a:t>
-            </a:r>
-            <a:endParaRPr lang="zh-CN" altLang="zh-CN" dirty="0"/>
-          </a:p>
-          <a:p>
-            <a:r>
-              <a:rPr lang="en-US" altLang="zh-CN" dirty="0"/>
-              <a:t>YF390-0HF8P-M81RQ-2DXQE-M2UT6</a:t>
-            </a:r>
-            <a:endParaRPr lang="zh-CN" altLang="zh-CN" dirty="0"/>
-          </a:p>
-          <a:p>
-            <a:r>
-              <a:rPr lang="en-US" altLang="zh-CN" dirty="0"/>
-              <a:t>ZF71R-DMX85-08DQY-8YMNC-PPHV8</a:t>
-            </a:r>
-            <a:endParaRPr lang="zh-CN" altLang="zh-CN" dirty="0"/>
-          </a:p>
-          <a:p>
+              <a:rPr lang="zh-CN" altLang="en-US" dirty="0"/>
+              <a:t>？</a:t>
+            </a:r>
             <a:endParaRPr lang="en-US" altLang="zh-CN" dirty="0">
               <a:solidFill>
                 <a:srgbClr val="777777"/>
@@ -3832,7 +3780,7 @@
           <a:lstStyle/>
           <a:p>
             <a:r>
-              <a:rPr lang="zh-CN" altLang="en-US" dirty="0" smtClean="0"/>
+              <a:rPr lang="zh-CN" altLang="en-US" dirty="0"/>
               <a:t>在钉钉群下载虚拟机</a:t>
             </a:r>
             <a:r>
@@ -4070,16 +4018,12 @@
               <a:t>点击开启此虚拟机，进入</a:t>
             </a:r>
             <a:r>
-              <a:rPr lang="en-US" altLang="zh-CN" dirty="0" smtClean="0"/>
+              <a:rPr lang="en-US" altLang="zh-CN" dirty="0"/>
               <a:t>ubuntu20</a:t>
             </a:r>
             <a:r>
-              <a:rPr lang="zh-CN" altLang="en-US" dirty="0" smtClean="0"/>
-              <a:t>系统</a:t>
-            </a:r>
-            <a:r>
               <a:rPr lang="zh-CN" altLang="en-US" dirty="0"/>
-              <a:t>，账号和密码都是</a:t>
+              <a:t>系统，账号和密码都是</a:t>
             </a:r>
             <a:r>
               <a:rPr lang="en-US" altLang="zh-CN" dirty="0" err="1"/>
@@ -4193,16 +4137,12 @@
           <a:lstStyle/>
           <a:p>
             <a:r>
-              <a:rPr lang="zh-CN" altLang="en-US" sz="3200" dirty="0" smtClean="0">
+              <a:rPr lang="zh-CN" altLang="en-US" sz="3200" dirty="0">
                 <a:latin typeface="宋体" panose="02010600030101010101" pitchFamily="2" charset="-122"/>
                 <a:ea typeface="宋体" panose="02010600030101010101" pitchFamily="2" charset="-122"/>
               </a:rPr>
               <a:t>实验课镜像说明</a:t>
             </a:r>
-            <a:endParaRPr lang="zh-CN" altLang="en-US" sz="3200" dirty="0">
-              <a:latin typeface="宋体" panose="02010600030101010101" pitchFamily="2" charset="-122"/>
-              <a:ea typeface="宋体" panose="02010600030101010101" pitchFamily="2" charset="-122"/>
-            </a:endParaRPr>
           </a:p>
         </p:txBody>
       </p:sp>
@@ -4215,7 +4155,7 @@
         <p:spPr>
           <a:xfrm>
             <a:off x="742245" y="1617398"/>
-            <a:ext cx="10356679" cy="1200329"/>
+            <a:ext cx="10356679" cy="923330"/>
           </a:xfrm>
           <a:prstGeom prst="rect">
             <a:avLst/>
@@ -4234,29 +4174,25 @@
             </a:pPr>
             <a:r>
               <a:rPr lang="zh-CN" altLang="en-US" dirty="0"/>
-              <a:t>实验</a:t>
-            </a:r>
-            <a:r>
-              <a:rPr lang="zh-CN" altLang="en-US" dirty="0" smtClean="0"/>
-              <a:t>一到实验三的</a:t>
-            </a:r>
-            <a:r>
-              <a:rPr lang="en-US" altLang="zh-CN" dirty="0" err="1" smtClean="0"/>
+              <a:t>实验一到实验三的</a:t>
+            </a:r>
+            <a:r>
+              <a:rPr lang="en-US" altLang="zh-CN" dirty="0" err="1"/>
               <a:t>MiniChain</a:t>
             </a:r>
             <a:r>
-              <a:rPr lang="zh-CN" altLang="en-US" dirty="0" smtClean="0"/>
+              <a:rPr lang="zh-CN" altLang="en-US" dirty="0"/>
               <a:t>代码只需要简单的</a:t>
             </a:r>
             <a:r>
-              <a:rPr lang="en-US" altLang="zh-CN" dirty="0" smtClean="0"/>
+              <a:rPr lang="en-US" altLang="zh-CN" dirty="0"/>
               <a:t>JAVA</a:t>
             </a:r>
             <a:r>
-              <a:rPr lang="zh-CN" altLang="en-US" dirty="0" smtClean="0"/>
+              <a:rPr lang="zh-CN" altLang="en-US" dirty="0"/>
               <a:t>环境，大家可以自行在本机进行实验</a:t>
             </a:r>
-            <a:endParaRPr lang="en-US" altLang="zh-CN" dirty="0" smtClean="0"/>
+            <a:endParaRPr lang="en-US" altLang="zh-CN" dirty="0"/>
           </a:p>
           <a:p>
             <a:pPr marL="742950" lvl="1" indent="-285750">
@@ -4264,42 +4200,26 @@
               <a:buChar char="•"/>
             </a:pPr>
             <a:r>
-              <a:rPr lang="zh-CN" altLang="en-US" dirty="0" smtClean="0"/>
+              <a:rPr lang="zh-CN" altLang="en-US" dirty="0"/>
               <a:t>如果本机没有</a:t>
             </a:r>
             <a:r>
-              <a:rPr lang="en-US" altLang="zh-CN" dirty="0" smtClean="0"/>
+              <a:rPr lang="en-US" altLang="zh-CN" dirty="0"/>
               <a:t>JAVA</a:t>
             </a:r>
             <a:r>
-              <a:rPr lang="zh-CN" altLang="en-US" dirty="0" smtClean="0"/>
-              <a:t>环境或环境出现兼容等问题，可以使用</a:t>
-            </a:r>
-            <a:r>
-              <a:rPr lang="zh-CN" altLang="en-US" dirty="0" smtClean="0"/>
-              <a:t>下面</a:t>
-            </a:r>
-            <a:r>
               <a:rPr lang="zh-CN" altLang="en-US" dirty="0"/>
-              <a:t>以下</a:t>
-            </a:r>
-            <a:r>
-              <a:rPr lang="zh-CN" altLang="en-US" dirty="0" smtClean="0"/>
-              <a:t>链接</a:t>
-            </a:r>
-            <a:r>
-              <a:rPr lang="zh-CN" altLang="en-US" dirty="0" smtClean="0"/>
-              <a:t>里的</a:t>
-            </a:r>
-            <a:r>
-              <a:rPr lang="en-US" altLang="zh-CN" dirty="0" smtClean="0"/>
+              <a:t>环境或环境出现兼容等问题，可以使用下面以下链接里的</a:t>
+            </a:r>
+            <a:r>
+              <a:rPr lang="en-US" altLang="zh-CN" dirty="0"/>
               <a:t>Ubuntu16</a:t>
             </a:r>
             <a:r>
-              <a:rPr lang="zh-CN" altLang="en-US" dirty="0" smtClean="0"/>
+              <a:rPr lang="zh-CN" altLang="en-US" dirty="0"/>
               <a:t>镜像</a:t>
             </a:r>
-            <a:endParaRPr lang="en-US" altLang="zh-CN" dirty="0" smtClean="0"/>
+            <a:endParaRPr lang="en-US" altLang="zh-CN" dirty="0"/>
           </a:p>
           <a:p>
             <a:pPr marL="742950" lvl="1" indent="-285750">
@@ -4307,17 +4227,9 @@
               <a:buChar char="•"/>
             </a:pPr>
             <a:r>
-              <a:rPr lang="en-US" altLang="zh-CN" dirty="0"/>
-              <a:t>https://pan.baidu.com/s/1poCTODKvse7hPoQ5Qe0X8A?pwd=1234</a:t>
-            </a:r>
-            <a:endParaRPr lang="en-US" altLang="zh-CN" dirty="0" smtClean="0"/>
-          </a:p>
-          <a:p>
-            <a:pPr marL="742950" lvl="1" indent="-285750">
-              <a:buFont typeface="Arial" panose="020B0604020202020204" pitchFamily="34" charset="0"/>
-              <a:buChar char="•"/>
-            </a:pPr>
-            <a:endParaRPr lang="zh-CN" altLang="en-US" dirty="0"/>
+              <a:rPr lang="zh-CN" altLang="en-US" dirty="0"/>
+              <a:t>？</a:t>
+            </a:r>
           </a:p>
         </p:txBody>
       </p:sp>
@@ -4398,16 +4310,12 @@
           <a:lstStyle/>
           <a:p>
             <a:r>
-              <a:rPr lang="zh-CN" altLang="en-US" sz="3200" dirty="0" smtClean="0">
+              <a:rPr lang="zh-CN" altLang="en-US" sz="3200" dirty="0">
                 <a:latin typeface="宋体" panose="02010600030101010101" pitchFamily="2" charset="-122"/>
                 <a:ea typeface="宋体" panose="02010600030101010101" pitchFamily="2" charset="-122"/>
               </a:rPr>
               <a:t>实验课镜像说明</a:t>
             </a:r>
-            <a:endParaRPr lang="zh-CN" altLang="en-US" sz="3200" dirty="0">
-              <a:latin typeface="宋体" panose="02010600030101010101" pitchFamily="2" charset="-122"/>
-              <a:ea typeface="宋体" panose="02010600030101010101" pitchFamily="2" charset="-122"/>
-            </a:endParaRPr>
           </a:p>
         </p:txBody>
       </p:sp>
@@ -4439,29 +4347,25 @@
             </a:pPr>
             <a:r>
               <a:rPr lang="zh-CN" altLang="en-US" dirty="0"/>
-              <a:t>实验</a:t>
-            </a:r>
-            <a:r>
-              <a:rPr lang="zh-CN" altLang="en-US" dirty="0" smtClean="0"/>
-              <a:t>一到实验三的</a:t>
-            </a:r>
-            <a:r>
-              <a:rPr lang="en-US" altLang="zh-CN" dirty="0" err="1" smtClean="0"/>
+              <a:t>实验一到实验三的</a:t>
+            </a:r>
+            <a:r>
+              <a:rPr lang="en-US" altLang="zh-CN" dirty="0" err="1"/>
               <a:t>MiniChain</a:t>
             </a:r>
             <a:r>
-              <a:rPr lang="zh-CN" altLang="en-US" dirty="0" smtClean="0"/>
+              <a:rPr lang="zh-CN" altLang="en-US" dirty="0"/>
               <a:t>代码只需要简单的</a:t>
             </a:r>
             <a:r>
-              <a:rPr lang="en-US" altLang="zh-CN" dirty="0" smtClean="0"/>
+              <a:rPr lang="en-US" altLang="zh-CN" dirty="0"/>
               <a:t>JAVA</a:t>
             </a:r>
             <a:r>
-              <a:rPr lang="zh-CN" altLang="en-US" dirty="0" smtClean="0"/>
+              <a:rPr lang="zh-CN" altLang="en-US" dirty="0"/>
               <a:t>环境，大家可以自行在本机进行实验</a:t>
             </a:r>
-            <a:endParaRPr lang="en-US" altLang="zh-CN" dirty="0" smtClean="0"/>
+            <a:endParaRPr lang="en-US" altLang="zh-CN" dirty="0"/>
           </a:p>
           <a:p>
             <a:pPr marL="742950" lvl="1" indent="-285750">
@@ -4469,42 +4373,26 @@
               <a:buChar char="•"/>
             </a:pPr>
             <a:r>
-              <a:rPr lang="zh-CN" altLang="en-US" dirty="0" smtClean="0"/>
+              <a:rPr lang="zh-CN" altLang="en-US" dirty="0"/>
               <a:t>如果本机没有</a:t>
             </a:r>
             <a:r>
-              <a:rPr lang="en-US" altLang="zh-CN" dirty="0" smtClean="0"/>
+              <a:rPr lang="en-US" altLang="zh-CN" dirty="0"/>
               <a:t>JAVA</a:t>
             </a:r>
             <a:r>
-              <a:rPr lang="zh-CN" altLang="en-US" dirty="0" smtClean="0"/>
-              <a:t>环境或环境出现兼容等问题，可以使用</a:t>
-            </a:r>
-            <a:r>
-              <a:rPr lang="zh-CN" altLang="en-US" dirty="0" smtClean="0"/>
-              <a:t>下面</a:t>
-            </a:r>
-            <a:r>
               <a:rPr lang="zh-CN" altLang="en-US" dirty="0"/>
-              <a:t>以下</a:t>
-            </a:r>
-            <a:r>
-              <a:rPr lang="zh-CN" altLang="en-US" dirty="0" smtClean="0"/>
-              <a:t>链接</a:t>
-            </a:r>
-            <a:r>
-              <a:rPr lang="zh-CN" altLang="en-US" dirty="0" smtClean="0"/>
-              <a:t>里的</a:t>
-            </a:r>
-            <a:r>
-              <a:rPr lang="en-US" altLang="zh-CN" dirty="0" smtClean="0"/>
+              <a:t>环境或环境出现兼容等问题，可以使用下面以下链接里的</a:t>
+            </a:r>
+            <a:r>
+              <a:rPr lang="en-US" altLang="zh-CN" dirty="0"/>
               <a:t>Ubuntu16</a:t>
             </a:r>
             <a:r>
-              <a:rPr lang="zh-CN" altLang="en-US" dirty="0" smtClean="0"/>
+              <a:rPr lang="zh-CN" altLang="en-US" dirty="0"/>
               <a:t>镜像</a:t>
             </a:r>
-            <a:endParaRPr lang="en-US" altLang="zh-CN" dirty="0" smtClean="0"/>
+            <a:endParaRPr lang="en-US" altLang="zh-CN" dirty="0"/>
           </a:p>
           <a:p>
             <a:pPr marL="742950" lvl="1" indent="-285750">
@@ -4512,22 +4400,9 @@
               <a:buChar char="•"/>
             </a:pPr>
             <a:r>
-              <a:rPr lang="en-US" altLang="zh-CN" dirty="0">
-                <a:hlinkClick r:id="rId2"/>
-              </a:rPr>
-              <a:t>https://blockchain.550w.host</a:t>
-            </a:r>
-            <a:r>
-              <a:rPr lang="en-US" altLang="zh-CN" dirty="0" smtClean="0">
-                <a:hlinkClick r:id="rId2"/>
-              </a:rPr>
-              <a:t>/</a:t>
-            </a:r>
-            <a:r>
-              <a:rPr lang="zh-CN" altLang="en-US" dirty="0" smtClean="0"/>
-              <a:t>，必须用校园网</a:t>
-            </a:r>
-            <a:endParaRPr lang="zh-CN" altLang="en-US" dirty="0"/>
+              <a:rPr lang="zh-CN" altLang="en-US" dirty="0"/>
+              <a:t>？</a:t>
+            </a:r>
           </a:p>
         </p:txBody>
       </p:sp>
@@ -4540,7 +4415,7 @@
           <p:nvPr/>
         </p:nvPicPr>
         <p:blipFill>
-          <a:blip r:embed="rId3"/>
+          <a:blip r:embed="rId2"/>
           <a:stretch>
             <a:fillRect/>
           </a:stretch>
@@ -4564,7 +4439,7 @@
           <p:nvPr/>
         </p:nvPicPr>
         <p:blipFill>
-          <a:blip r:embed="rId4"/>
+          <a:blip r:embed="rId3"/>
           <a:stretch>
             <a:fillRect/>
           </a:stretch>
@@ -4668,16 +4543,12 @@
           <a:lstStyle/>
           <a:p>
             <a:r>
-              <a:rPr lang="zh-CN" altLang="en-US" sz="3200" dirty="0" smtClean="0">
+              <a:rPr lang="zh-CN" altLang="en-US" sz="3200" dirty="0">
                 <a:latin typeface="宋体" panose="02010600030101010101" pitchFamily="2" charset="-122"/>
                 <a:ea typeface="宋体" panose="02010600030101010101" pitchFamily="2" charset="-122"/>
               </a:rPr>
               <a:t>实验课镜像说明</a:t>
             </a:r>
-            <a:endParaRPr lang="zh-CN" altLang="en-US" sz="3200" dirty="0">
-              <a:latin typeface="宋体" panose="02010600030101010101" pitchFamily="2" charset="-122"/>
-              <a:ea typeface="宋体" panose="02010600030101010101" pitchFamily="2" charset="-122"/>
-            </a:endParaRPr>
           </a:p>
         </p:txBody>
       </p:sp>
@@ -4708,10 +4579,10 @@
               <a:buChar char="•"/>
             </a:pPr>
             <a:r>
-              <a:rPr lang="zh-CN" altLang="en-US" dirty="0" smtClean="0"/>
+              <a:rPr lang="zh-CN" altLang="en-US" dirty="0"/>
               <a:t>实验四及以后的实验会需要配置一系列的环境</a:t>
             </a:r>
-            <a:endParaRPr lang="en-US" altLang="zh-CN" dirty="0" smtClean="0"/>
+            <a:endParaRPr lang="en-US" altLang="zh-CN" dirty="0"/>
           </a:p>
           <a:p>
             <a:pPr marL="742950" lvl="1" indent="-285750">
@@ -4719,10 +4590,10 @@
               <a:buChar char="•"/>
             </a:pPr>
             <a:r>
-              <a:rPr lang="zh-CN" altLang="en-US" dirty="0" smtClean="0"/>
+              <a:rPr lang="zh-CN" altLang="en-US" dirty="0"/>
               <a:t>大家可以自行配置环境进行练习，也可以使用钉钉群里发出的镜像进行实验</a:t>
             </a:r>
-            <a:endParaRPr lang="en-US" altLang="zh-CN" dirty="0" smtClean="0"/>
+            <a:endParaRPr lang="en-US" altLang="zh-CN" dirty="0"/>
           </a:p>
           <a:p>
             <a:pPr marL="742950" lvl="1" indent="-285750">
@@ -4730,10 +4601,9 @@
               <a:buChar char="•"/>
             </a:pPr>
             <a:r>
-              <a:rPr lang="zh-CN" altLang="en-US" dirty="0" smtClean="0"/>
+              <a:rPr lang="zh-CN" altLang="en-US" dirty="0"/>
               <a:t>具体镜像使用方式已经在前面进行了说明</a:t>
             </a:r>
-            <a:endParaRPr lang="zh-CN" altLang="en-US" dirty="0"/>
           </a:p>
         </p:txBody>
       </p:sp>

</xml_diff>